<commit_message>
updating the taks and presentation
</commit_message>
<xml_diff>
--- a/Hands-on slides.pptx
+++ b/Hands-on slides.pptx
@@ -13,7 +13,15 @@
     <p:sldId id="261" r:id="rId7"/>
     <p:sldId id="264" r:id="rId8"/>
     <p:sldId id="262" r:id="rId9"/>
-    <p:sldId id="263" r:id="rId10"/>
+    <p:sldId id="271" r:id="rId10"/>
+    <p:sldId id="266" r:id="rId11"/>
+    <p:sldId id="263" r:id="rId12"/>
+    <p:sldId id="273" r:id="rId13"/>
+    <p:sldId id="265" r:id="rId14"/>
+    <p:sldId id="267" r:id="rId15"/>
+    <p:sldId id="268" r:id="rId16"/>
+    <p:sldId id="269" r:id="rId17"/>
+    <p:sldId id="270" r:id="rId18"/>
   </p:sldIdLst>
   <p:sldSz cx="12192000" cy="6858000"/>
   <p:notesSz cx="6858000" cy="9144000"/>
@@ -346,7 +354,7 @@
           <a:p>
             <a:fld id="{CA79C2A5-9A78-482B-8287-E9F899BA3661}" type="datetimeFigureOut">
               <a:rPr lang="en-US" smtClean="0"/>
-              <a:t>5/21/2018</a:t>
+              <a:t>5/23/2018</a:t>
             </a:fld>
             <a:endParaRPr lang="en-US"/>
           </a:p>
@@ -554,7 +562,7 @@
           <a:p>
             <a:fld id="{CA79C2A5-9A78-482B-8287-E9F899BA3661}" type="datetimeFigureOut">
               <a:rPr lang="en-US" smtClean="0"/>
-              <a:t>5/21/2018</a:t>
+              <a:t>5/23/2018</a:t>
             </a:fld>
             <a:endParaRPr lang="en-US"/>
           </a:p>
@@ -810,7 +818,7 @@
           <a:p>
             <a:fld id="{CA79C2A5-9A78-482B-8287-E9F899BA3661}" type="datetimeFigureOut">
               <a:rPr lang="en-US" smtClean="0"/>
-              <a:t>5/21/2018</a:t>
+              <a:t>5/23/2018</a:t>
             </a:fld>
             <a:endParaRPr lang="en-US"/>
           </a:p>
@@ -984,7 +992,7 @@
           <a:p>
             <a:fld id="{CA79C2A5-9A78-482B-8287-E9F899BA3661}" type="datetimeFigureOut">
               <a:rPr lang="en-US" smtClean="0"/>
-              <a:t>5/21/2018</a:t>
+              <a:t>5/23/2018</a:t>
             </a:fld>
             <a:endParaRPr lang="en-US"/>
           </a:p>
@@ -1327,7 +1335,7 @@
           <a:p>
             <a:fld id="{CA79C2A5-9A78-482B-8287-E9F899BA3661}" type="datetimeFigureOut">
               <a:rPr lang="en-US" smtClean="0"/>
-              <a:t>5/21/2018</a:t>
+              <a:t>5/23/2018</a:t>
             </a:fld>
             <a:endParaRPr lang="en-US"/>
           </a:p>
@@ -1602,7 +1610,7 @@
           <a:p>
             <a:fld id="{CA79C2A5-9A78-482B-8287-E9F899BA3661}" type="datetimeFigureOut">
               <a:rPr lang="en-US" smtClean="0"/>
-              <a:t>5/21/2018</a:t>
+              <a:t>5/23/2018</a:t>
             </a:fld>
             <a:endParaRPr lang="en-US"/>
           </a:p>
@@ -1981,7 +1989,7 @@
           <a:p>
             <a:fld id="{CA79C2A5-9A78-482B-8287-E9F899BA3661}" type="datetimeFigureOut">
               <a:rPr lang="en-US" smtClean="0"/>
-              <a:t>5/21/2018</a:t>
+              <a:t>5/23/2018</a:t>
             </a:fld>
             <a:endParaRPr lang="en-US"/>
           </a:p>
@@ -2099,7 +2107,7 @@
           <a:p>
             <a:fld id="{CA79C2A5-9A78-482B-8287-E9F899BA3661}" type="datetimeFigureOut">
               <a:rPr lang="en-US" smtClean="0"/>
-              <a:t>5/21/2018</a:t>
+              <a:t>5/23/2018</a:t>
             </a:fld>
             <a:endParaRPr lang="en-US"/>
           </a:p>
@@ -2270,7 +2278,7 @@
           <a:p>
             <a:fld id="{CA79C2A5-9A78-482B-8287-E9F899BA3661}" type="datetimeFigureOut">
               <a:rPr lang="en-US" smtClean="0"/>
-              <a:t>5/21/2018</a:t>
+              <a:t>5/23/2018</a:t>
             </a:fld>
             <a:endParaRPr lang="en-US"/>
           </a:p>
@@ -2624,7 +2632,7 @@
           <a:p>
             <a:fld id="{CA79C2A5-9A78-482B-8287-E9F899BA3661}" type="datetimeFigureOut">
               <a:rPr lang="en-US" smtClean="0"/>
-              <a:t>5/21/2018</a:t>
+              <a:t>5/23/2018</a:t>
             </a:fld>
             <a:endParaRPr lang="en-US"/>
           </a:p>
@@ -3006,7 +3014,7 @@
           <a:p>
             <a:fld id="{CA79C2A5-9A78-482B-8287-E9F899BA3661}" type="datetimeFigureOut">
               <a:rPr lang="en-US" smtClean="0"/>
-              <a:t>5/21/2018</a:t>
+              <a:t>5/23/2018</a:t>
             </a:fld>
             <a:endParaRPr lang="en-US"/>
           </a:p>
@@ -3293,7 +3301,7 @@
           <a:p>
             <a:fld id="{CA79C2A5-9A78-482B-8287-E9F899BA3661}" type="datetimeFigureOut">
               <a:rPr lang="en-US" smtClean="0"/>
-              <a:t>5/21/2018</a:t>
+              <a:t>5/23/2018</a:t>
             </a:fld>
             <a:endParaRPr lang="en-US"/>
           </a:p>
@@ -3891,6 +3899,944 @@
 </p:sld>
 </file>
 
+<file path=ppt/slides/slide10.xml><?xml version="1.0" encoding="utf-8"?>
+<p:sld xmlns:a="http://schemas.openxmlformats.org/drawingml/2006/main" xmlns:r="http://schemas.openxmlformats.org/officeDocument/2006/relationships" xmlns:p="http://schemas.openxmlformats.org/presentationml/2006/main">
+  <p:cSld>
+    <p:spTree>
+      <p:nvGrpSpPr>
+        <p:cNvPr id="1" name=""/>
+        <p:cNvGrpSpPr/>
+        <p:nvPr/>
+      </p:nvGrpSpPr>
+      <p:grpSpPr>
+        <a:xfrm>
+          <a:off x="0" y="0"/>
+          <a:ext cx="0" cy="0"/>
+          <a:chOff x="0" y="0"/>
+          <a:chExt cx="0" cy="0"/>
+        </a:xfrm>
+      </p:grpSpPr>
+      <p:sp>
+        <p:nvSpPr>
+          <p:cNvPr id="2" name="Title 1"/>
+          <p:cNvSpPr>
+            <a:spLocks noGrp="1"/>
+          </p:cNvSpPr>
+          <p:nvPr>
+            <p:ph type="title"/>
+          </p:nvPr>
+        </p:nvSpPr>
+        <p:spPr>
+          <a:xfrm>
+            <a:off x="1097280" y="286603"/>
+            <a:ext cx="3550920" cy="1450757"/>
+          </a:xfrm>
+        </p:spPr>
+        <p:txBody>
+          <a:bodyPr/>
+          <a:lstStyle/>
+          <a:p>
+            <a:r>
+              <a:rPr lang="en-US" dirty="0" smtClean="0"/>
+              <a:t>Functional API</a:t>
+            </a:r>
+            <a:endParaRPr lang="en-US" dirty="0"/>
+          </a:p>
+        </p:txBody>
+      </p:sp>
+      <p:sp>
+        <p:nvSpPr>
+          <p:cNvPr id="3" name="Content Placeholder 2"/>
+          <p:cNvSpPr>
+            <a:spLocks noGrp="1"/>
+          </p:cNvSpPr>
+          <p:nvPr>
+            <p:ph idx="1"/>
+          </p:nvPr>
+        </p:nvSpPr>
+        <p:spPr/>
+        <p:txBody>
+          <a:bodyPr/>
+          <a:lstStyle/>
+          <a:p>
+            <a:endParaRPr lang="en-US" dirty="0"/>
+          </a:p>
+        </p:txBody>
+      </p:sp>
+      <p:pic>
+        <p:nvPicPr>
+          <p:cNvPr id="4" name="Picture 3"/>
+          <p:cNvPicPr>
+            <a:picLocks noChangeAspect="1"/>
+          </p:cNvPicPr>
+          <p:nvPr/>
+        </p:nvPicPr>
+        <p:blipFill>
+          <a:blip r:embed="rId2"/>
+          <a:stretch>
+            <a:fillRect/>
+          </a:stretch>
+        </p:blipFill>
+        <p:spPr>
+          <a:xfrm>
+            <a:off x="4376304" y="1011981"/>
+            <a:ext cx="7815696" cy="4856897"/>
+          </a:xfrm>
+          <a:prstGeom prst="rect">
+            <a:avLst/>
+          </a:prstGeom>
+        </p:spPr>
+      </p:pic>
+    </p:spTree>
+    <p:extLst>
+      <p:ext uri="{BB962C8B-B14F-4D97-AF65-F5344CB8AC3E}">
+        <p14:creationId xmlns:p14="http://schemas.microsoft.com/office/powerpoint/2010/main" val="3321968974"/>
+      </p:ext>
+    </p:extLst>
+  </p:cSld>
+  <p:clrMapOvr>
+    <a:masterClrMapping/>
+  </p:clrMapOvr>
+</p:sld>
+</file>
+
+<file path=ppt/slides/slide11.xml><?xml version="1.0" encoding="utf-8"?>
+<p:sld xmlns:a="http://schemas.openxmlformats.org/drawingml/2006/main" xmlns:r="http://schemas.openxmlformats.org/officeDocument/2006/relationships" xmlns:p="http://schemas.openxmlformats.org/presentationml/2006/main">
+  <p:cSld>
+    <p:spTree>
+      <p:nvGrpSpPr>
+        <p:cNvPr id="1" name=""/>
+        <p:cNvGrpSpPr/>
+        <p:nvPr/>
+      </p:nvGrpSpPr>
+      <p:grpSpPr>
+        <a:xfrm>
+          <a:off x="0" y="0"/>
+          <a:ext cx="0" cy="0"/>
+          <a:chOff x="0" y="0"/>
+          <a:chExt cx="0" cy="0"/>
+        </a:xfrm>
+      </p:grpSpPr>
+      <p:sp>
+        <p:nvSpPr>
+          <p:cNvPr id="2" name="Title 1"/>
+          <p:cNvSpPr>
+            <a:spLocks noGrp="1"/>
+          </p:cNvSpPr>
+          <p:nvPr>
+            <p:ph type="title"/>
+          </p:nvPr>
+        </p:nvSpPr>
+        <p:spPr/>
+        <p:txBody>
+          <a:bodyPr/>
+          <a:lstStyle/>
+          <a:p>
+            <a:r>
+              <a:rPr lang="en-US" dirty="0" smtClean="0"/>
+              <a:t>Hands on time</a:t>
+            </a:r>
+            <a:endParaRPr lang="en-US" dirty="0"/>
+          </a:p>
+        </p:txBody>
+      </p:sp>
+      <p:sp>
+        <p:nvSpPr>
+          <p:cNvPr id="3" name="Content Placeholder 2"/>
+          <p:cNvSpPr>
+            <a:spLocks noGrp="1"/>
+          </p:cNvSpPr>
+          <p:nvPr>
+            <p:ph idx="1"/>
+          </p:nvPr>
+        </p:nvSpPr>
+        <p:spPr/>
+        <p:txBody>
+          <a:bodyPr/>
+          <a:lstStyle/>
+          <a:p>
+            <a:endParaRPr lang="en-US"/>
+          </a:p>
+        </p:txBody>
+      </p:sp>
+      <p:pic>
+        <p:nvPicPr>
+          <p:cNvPr id="1026" name="Picture 2" descr="JAZZ HANDS Cat cat small to medium sized cats cat like mammal whiskers"/>
+          <p:cNvPicPr>
+            <a:picLocks noChangeAspect="1" noChangeArrowheads="1"/>
+          </p:cNvPicPr>
+          <p:nvPr/>
+        </p:nvPicPr>
+        <p:blipFill>
+          <a:blip r:embed="rId2">
+            <a:extLst>
+              <a:ext uri="{28A0092B-C50C-407E-A947-70E740481C1C}">
+                <a14:useLocalDpi xmlns:a14="http://schemas.microsoft.com/office/drawing/2010/main" val="0"/>
+              </a:ext>
+            </a:extLst>
+          </a:blip>
+          <a:srcRect/>
+          <a:stretch>
+            <a:fillRect/>
+          </a:stretch>
+        </p:blipFill>
+        <p:spPr bwMode="auto">
+          <a:xfrm>
+            <a:off x="4643717" y="1737360"/>
+            <a:ext cx="3409763" cy="4439796"/>
+          </a:xfrm>
+          <a:prstGeom prst="rect">
+            <a:avLst/>
+          </a:prstGeom>
+          <a:noFill/>
+          <a:extLst>
+            <a:ext uri="{909E8E84-426E-40DD-AFC4-6F175D3DCCD1}">
+              <a14:hiddenFill xmlns:a14="http://schemas.microsoft.com/office/drawing/2010/main">
+                <a:solidFill>
+                  <a:srgbClr val="FFFFFF"/>
+                </a:solidFill>
+              </a14:hiddenFill>
+            </a:ext>
+          </a:extLst>
+        </p:spPr>
+      </p:pic>
+    </p:spTree>
+    <p:extLst>
+      <p:ext uri="{BB962C8B-B14F-4D97-AF65-F5344CB8AC3E}">
+        <p14:creationId xmlns:p14="http://schemas.microsoft.com/office/powerpoint/2010/main" val="2642274662"/>
+      </p:ext>
+    </p:extLst>
+  </p:cSld>
+  <p:clrMapOvr>
+    <a:masterClrMapping/>
+  </p:clrMapOvr>
+</p:sld>
+</file>
+
+<file path=ppt/slides/slide12.xml><?xml version="1.0" encoding="utf-8"?>
+<p:sld xmlns:a="http://schemas.openxmlformats.org/drawingml/2006/main" xmlns:r="http://schemas.openxmlformats.org/officeDocument/2006/relationships" xmlns:p="http://schemas.openxmlformats.org/presentationml/2006/main">
+  <p:cSld>
+    <p:spTree>
+      <p:nvGrpSpPr>
+        <p:cNvPr id="1" name=""/>
+        <p:cNvGrpSpPr/>
+        <p:nvPr/>
+      </p:nvGrpSpPr>
+      <p:grpSpPr>
+        <a:xfrm>
+          <a:off x="0" y="0"/>
+          <a:ext cx="0" cy="0"/>
+          <a:chOff x="0" y="0"/>
+          <a:chExt cx="0" cy="0"/>
+        </a:xfrm>
+      </p:grpSpPr>
+      <p:sp>
+        <p:nvSpPr>
+          <p:cNvPr id="2" name="Title 1"/>
+          <p:cNvSpPr>
+            <a:spLocks noGrp="1"/>
+          </p:cNvSpPr>
+          <p:nvPr>
+            <p:ph type="title"/>
+          </p:nvPr>
+        </p:nvSpPr>
+        <p:spPr/>
+        <p:txBody>
+          <a:bodyPr/>
+          <a:lstStyle/>
+          <a:p>
+            <a:r>
+              <a:rPr lang="en-US" dirty="0" smtClean="0"/>
+              <a:t>Loss</a:t>
+            </a:r>
+            <a:endParaRPr lang="en-US" dirty="0"/>
+          </a:p>
+        </p:txBody>
+      </p:sp>
+      <p:sp>
+        <p:nvSpPr>
+          <p:cNvPr id="3" name="Content Placeholder 2"/>
+          <p:cNvSpPr>
+            <a:spLocks noGrp="1"/>
+          </p:cNvSpPr>
+          <p:nvPr>
+            <p:ph idx="1"/>
+          </p:nvPr>
+        </p:nvSpPr>
+        <p:spPr>
+          <a:xfrm>
+            <a:off x="1097280" y="1845734"/>
+            <a:ext cx="4865370" cy="4023360"/>
+          </a:xfrm>
+        </p:spPr>
+        <p:txBody>
+          <a:bodyPr>
+            <a:normAutofit/>
+          </a:bodyPr>
+          <a:lstStyle/>
+          <a:p>
+            <a:r>
+              <a:rPr lang="en-US" sz="4000" dirty="0" smtClean="0"/>
+              <a:t>The paper </a:t>
+            </a:r>
+            <a:r>
+              <a:rPr lang="en-US" sz="4000" dirty="0"/>
+              <a:t>uses </a:t>
+            </a:r>
+            <a:r>
+              <a:rPr lang="en-US" sz="4000" dirty="0" err="1"/>
+              <a:t>binary_crossentropy</a:t>
+            </a:r>
+            <a:endParaRPr lang="en-US" sz="4000" dirty="0"/>
+          </a:p>
+        </p:txBody>
+      </p:sp>
+      <p:pic>
+        <p:nvPicPr>
+          <p:cNvPr id="5" name="Picture 4"/>
+          <p:cNvPicPr>
+            <a:picLocks noChangeAspect="1"/>
+          </p:cNvPicPr>
+          <p:nvPr/>
+        </p:nvPicPr>
+        <p:blipFill>
+          <a:blip r:embed="rId2"/>
+          <a:stretch>
+            <a:fillRect/>
+          </a:stretch>
+        </p:blipFill>
+        <p:spPr>
+          <a:xfrm>
+            <a:off x="5516880" y="1509501"/>
+            <a:ext cx="6381750" cy="4695825"/>
+          </a:xfrm>
+          <a:prstGeom prst="rect">
+            <a:avLst/>
+          </a:prstGeom>
+        </p:spPr>
+      </p:pic>
+    </p:spTree>
+    <p:extLst>
+      <p:ext uri="{BB962C8B-B14F-4D97-AF65-F5344CB8AC3E}">
+        <p14:creationId xmlns:p14="http://schemas.microsoft.com/office/powerpoint/2010/main" val="1264499104"/>
+      </p:ext>
+    </p:extLst>
+  </p:cSld>
+  <p:clrMapOvr>
+    <a:masterClrMapping/>
+  </p:clrMapOvr>
+</p:sld>
+</file>
+
+<file path=ppt/slides/slide13.xml><?xml version="1.0" encoding="utf-8"?>
+<p:sld xmlns:a="http://schemas.openxmlformats.org/drawingml/2006/main" xmlns:r="http://schemas.openxmlformats.org/officeDocument/2006/relationships" xmlns:p="http://schemas.openxmlformats.org/presentationml/2006/main">
+  <p:cSld>
+    <p:spTree>
+      <p:nvGrpSpPr>
+        <p:cNvPr id="1" name=""/>
+        <p:cNvGrpSpPr/>
+        <p:nvPr/>
+      </p:nvGrpSpPr>
+      <p:grpSpPr>
+        <a:xfrm>
+          <a:off x="0" y="0"/>
+          <a:ext cx="0" cy="0"/>
+          <a:chOff x="0" y="0"/>
+          <a:chExt cx="0" cy="0"/>
+        </a:xfrm>
+      </p:grpSpPr>
+      <p:sp>
+        <p:nvSpPr>
+          <p:cNvPr id="2" name="Title 1"/>
+          <p:cNvSpPr>
+            <a:spLocks noGrp="1"/>
+          </p:cNvSpPr>
+          <p:nvPr>
+            <p:ph type="title"/>
+          </p:nvPr>
+        </p:nvSpPr>
+        <p:spPr/>
+        <p:txBody>
+          <a:bodyPr/>
+          <a:lstStyle/>
+          <a:p>
+            <a:r>
+              <a:rPr lang="en-US" dirty="0" smtClean="0"/>
+              <a:t>Embedding layers</a:t>
+            </a:r>
+            <a:endParaRPr lang="en-US" dirty="0"/>
+          </a:p>
+        </p:txBody>
+      </p:sp>
+      <p:sp>
+        <p:nvSpPr>
+          <p:cNvPr id="3" name="Content Placeholder 2"/>
+          <p:cNvSpPr>
+            <a:spLocks noGrp="1"/>
+          </p:cNvSpPr>
+          <p:nvPr>
+            <p:ph idx="1"/>
+          </p:nvPr>
+        </p:nvSpPr>
+        <p:spPr/>
+        <p:txBody>
+          <a:bodyPr>
+            <a:normAutofit/>
+          </a:bodyPr>
+          <a:lstStyle/>
+          <a:p>
+            <a:r>
+              <a:rPr lang="en-US" sz="2800" b="1" dirty="0" err="1" smtClean="0"/>
+              <a:t>keras.layers.Embedding</a:t>
+            </a:r>
+            <a:endParaRPr lang="en-US" sz="2800" b="1" dirty="0" smtClean="0"/>
+          </a:p>
+          <a:p>
+            <a:pPr lvl="1"/>
+            <a:r>
+              <a:rPr lang="en-US" sz="2600" dirty="0" err="1" smtClean="0"/>
+              <a:t>input_dim</a:t>
+            </a:r>
+            <a:r>
+              <a:rPr lang="en-US" sz="2600" dirty="0" smtClean="0"/>
+              <a:t>: number of object @ input</a:t>
+            </a:r>
+          </a:p>
+          <a:p>
+            <a:pPr lvl="1"/>
+            <a:r>
+              <a:rPr lang="en-US" sz="2600" dirty="0" err="1" smtClean="0"/>
+              <a:t>output_dim</a:t>
+            </a:r>
+            <a:r>
+              <a:rPr lang="en-US" sz="2600" dirty="0" smtClean="0"/>
+              <a:t>: size of embedding (size of new feature space)</a:t>
+            </a:r>
+            <a:endParaRPr lang="en-US" sz="2800" dirty="0"/>
+          </a:p>
+        </p:txBody>
+      </p:sp>
+      <p:pic>
+        <p:nvPicPr>
+          <p:cNvPr id="2051" name="Picture 3" descr="Image result for embedding layer"/>
+          <p:cNvPicPr>
+            <a:picLocks noChangeAspect="1" noChangeArrowheads="1"/>
+          </p:cNvPicPr>
+          <p:nvPr/>
+        </p:nvPicPr>
+        <p:blipFill rotWithShape="1">
+          <a:blip r:embed="rId2">
+            <a:extLst>
+              <a:ext uri="{28A0092B-C50C-407E-A947-70E740481C1C}">
+                <a14:useLocalDpi xmlns:a14="http://schemas.microsoft.com/office/drawing/2010/main" val="0"/>
+              </a:ext>
+            </a:extLst>
+          </a:blip>
+          <a:srcRect t="18171"/>
+          <a:stretch/>
+        </p:blipFill>
+        <p:spPr bwMode="auto">
+          <a:xfrm>
+            <a:off x="2765426" y="4019550"/>
+            <a:ext cx="5418676" cy="2230545"/>
+          </a:xfrm>
+          <a:prstGeom prst="rect">
+            <a:avLst/>
+          </a:prstGeom>
+          <a:noFill/>
+          <a:extLst>
+            <a:ext uri="{909E8E84-426E-40DD-AFC4-6F175D3DCCD1}">
+              <a14:hiddenFill xmlns:a14="http://schemas.microsoft.com/office/drawing/2010/main">
+                <a:solidFill>
+                  <a:srgbClr val="FFFFFF"/>
+                </a:solidFill>
+              </a14:hiddenFill>
+            </a:ext>
+          </a:extLst>
+        </p:spPr>
+      </p:pic>
+      <p:sp>
+        <p:nvSpPr>
+          <p:cNvPr id="5" name="TextBox 4"/>
+          <p:cNvSpPr txBox="1"/>
+          <p:nvPr/>
+        </p:nvSpPr>
+        <p:spPr>
+          <a:xfrm>
+            <a:off x="3352800" y="3672748"/>
+            <a:ext cx="616579" cy="369332"/>
+          </a:xfrm>
+          <a:prstGeom prst="rect">
+            <a:avLst/>
+          </a:prstGeom>
+          <a:noFill/>
+        </p:spPr>
+        <p:txBody>
+          <a:bodyPr wrap="none" rtlCol="0">
+            <a:spAutoFit/>
+          </a:bodyPr>
+          <a:lstStyle/>
+          <a:p>
+            <a:r>
+              <a:rPr lang="en-US" dirty="0" smtClean="0"/>
+              <a:t>Item</a:t>
+            </a:r>
+            <a:endParaRPr lang="en-US" dirty="0"/>
+          </a:p>
+        </p:txBody>
+      </p:sp>
+    </p:spTree>
+    <p:extLst>
+      <p:ext uri="{BB962C8B-B14F-4D97-AF65-F5344CB8AC3E}">
+        <p14:creationId xmlns:p14="http://schemas.microsoft.com/office/powerpoint/2010/main" val="2715554688"/>
+      </p:ext>
+    </p:extLst>
+  </p:cSld>
+  <p:clrMapOvr>
+    <a:masterClrMapping/>
+  </p:clrMapOvr>
+</p:sld>
+</file>
+
+<file path=ppt/slides/slide14.xml><?xml version="1.0" encoding="utf-8"?>
+<p:sld xmlns:a="http://schemas.openxmlformats.org/drawingml/2006/main" xmlns:r="http://schemas.openxmlformats.org/officeDocument/2006/relationships" xmlns:p="http://schemas.openxmlformats.org/presentationml/2006/main">
+  <p:cSld>
+    <p:spTree>
+      <p:nvGrpSpPr>
+        <p:cNvPr id="1" name=""/>
+        <p:cNvGrpSpPr/>
+        <p:nvPr/>
+      </p:nvGrpSpPr>
+      <p:grpSpPr>
+        <a:xfrm>
+          <a:off x="0" y="0"/>
+          <a:ext cx="0" cy="0"/>
+          <a:chOff x="0" y="0"/>
+          <a:chExt cx="0" cy="0"/>
+        </a:xfrm>
+      </p:grpSpPr>
+      <p:sp>
+        <p:nvSpPr>
+          <p:cNvPr id="2" name="Title 1"/>
+          <p:cNvSpPr>
+            <a:spLocks noGrp="1"/>
+          </p:cNvSpPr>
+          <p:nvPr>
+            <p:ph type="title"/>
+          </p:nvPr>
+        </p:nvSpPr>
+        <p:spPr/>
+        <p:txBody>
+          <a:bodyPr/>
+          <a:lstStyle/>
+          <a:p>
+            <a:r>
+              <a:rPr lang="en-US" dirty="0" smtClean="0"/>
+              <a:t>Multiply</a:t>
+            </a:r>
+            <a:endParaRPr lang="en-US" dirty="0"/>
+          </a:p>
+        </p:txBody>
+      </p:sp>
+      <p:sp>
+        <p:nvSpPr>
+          <p:cNvPr id="3" name="Content Placeholder 2"/>
+          <p:cNvSpPr>
+            <a:spLocks noGrp="1"/>
+          </p:cNvSpPr>
+          <p:nvPr>
+            <p:ph idx="1"/>
+          </p:nvPr>
+        </p:nvSpPr>
+        <p:spPr/>
+        <p:txBody>
+          <a:bodyPr>
+            <a:normAutofit/>
+          </a:bodyPr>
+          <a:lstStyle/>
+          <a:p>
+            <a:r>
+              <a:rPr lang="en-US" sz="4000" dirty="0" err="1"/>
+              <a:t>keras.layers.Multiply</a:t>
+            </a:r>
+            <a:r>
+              <a:rPr lang="en-US" sz="4000" dirty="0"/>
+              <a:t>()</a:t>
+            </a:r>
+          </a:p>
+          <a:p>
+            <a:endParaRPr lang="en-US" sz="4000" dirty="0"/>
+          </a:p>
+        </p:txBody>
+      </p:sp>
+      <p:pic>
+        <p:nvPicPr>
+          <p:cNvPr id="5" name="Picture 4"/>
+          <p:cNvPicPr>
+            <a:picLocks noChangeAspect="1"/>
+          </p:cNvPicPr>
+          <p:nvPr/>
+        </p:nvPicPr>
+        <p:blipFill>
+          <a:blip r:embed="rId2"/>
+          <a:stretch>
+            <a:fillRect/>
+          </a:stretch>
+        </p:blipFill>
+        <p:spPr>
+          <a:xfrm>
+            <a:off x="2596318" y="3420979"/>
+            <a:ext cx="8101011" cy="2273968"/>
+          </a:xfrm>
+          <a:prstGeom prst="rect">
+            <a:avLst/>
+          </a:prstGeom>
+        </p:spPr>
+      </p:pic>
+    </p:spTree>
+    <p:extLst>
+      <p:ext uri="{BB962C8B-B14F-4D97-AF65-F5344CB8AC3E}">
+        <p14:creationId xmlns:p14="http://schemas.microsoft.com/office/powerpoint/2010/main" val="2801365517"/>
+      </p:ext>
+    </p:extLst>
+  </p:cSld>
+  <p:clrMapOvr>
+    <a:masterClrMapping/>
+  </p:clrMapOvr>
+</p:sld>
+</file>
+
+<file path=ppt/slides/slide15.xml><?xml version="1.0" encoding="utf-8"?>
+<p:sld xmlns:a="http://schemas.openxmlformats.org/drawingml/2006/main" xmlns:r="http://schemas.openxmlformats.org/officeDocument/2006/relationships" xmlns:p="http://schemas.openxmlformats.org/presentationml/2006/main">
+  <p:cSld>
+    <p:spTree>
+      <p:nvGrpSpPr>
+        <p:cNvPr id="1" name=""/>
+        <p:cNvGrpSpPr/>
+        <p:nvPr/>
+      </p:nvGrpSpPr>
+      <p:grpSpPr>
+        <a:xfrm>
+          <a:off x="0" y="0"/>
+          <a:ext cx="0" cy="0"/>
+          <a:chOff x="0" y="0"/>
+          <a:chExt cx="0" cy="0"/>
+        </a:xfrm>
+      </p:grpSpPr>
+      <p:sp>
+        <p:nvSpPr>
+          <p:cNvPr id="2" name="Title 1"/>
+          <p:cNvSpPr>
+            <a:spLocks noGrp="1"/>
+          </p:cNvSpPr>
+          <p:nvPr>
+            <p:ph type="title"/>
+          </p:nvPr>
+        </p:nvSpPr>
+        <p:spPr/>
+        <p:txBody>
+          <a:bodyPr/>
+          <a:lstStyle/>
+          <a:p>
+            <a:r>
+              <a:rPr lang="en-US" dirty="0" smtClean="0"/>
+              <a:t>Dense</a:t>
+            </a:r>
+            <a:endParaRPr lang="en-US" dirty="0"/>
+          </a:p>
+        </p:txBody>
+      </p:sp>
+      <p:sp>
+        <p:nvSpPr>
+          <p:cNvPr id="3" name="Content Placeholder 2"/>
+          <p:cNvSpPr>
+            <a:spLocks noGrp="1"/>
+          </p:cNvSpPr>
+          <p:nvPr>
+            <p:ph idx="1"/>
+          </p:nvPr>
+        </p:nvSpPr>
+        <p:spPr/>
+        <p:txBody>
+          <a:bodyPr>
+            <a:normAutofit/>
+          </a:bodyPr>
+          <a:lstStyle/>
+          <a:p>
+            <a:r>
+              <a:rPr lang="en-US" sz="3600" dirty="0" err="1"/>
+              <a:t>keras.layers.Dense</a:t>
+            </a:r>
+            <a:endParaRPr lang="en-US" sz="3600" dirty="0" smtClean="0"/>
+          </a:p>
+          <a:p>
+            <a:r>
+              <a:rPr lang="en-US" sz="3600" dirty="0" smtClean="0"/>
+              <a:t>Units: size of output space</a:t>
+            </a:r>
+          </a:p>
+          <a:p>
+            <a:r>
+              <a:rPr lang="en-US" sz="3600" dirty="0" smtClean="0"/>
+              <a:t>Activation: activation function (</a:t>
+            </a:r>
+            <a:r>
+              <a:rPr lang="en-US" sz="3600" dirty="0" err="1" smtClean="0"/>
+              <a:t>tanh</a:t>
+            </a:r>
+            <a:r>
+              <a:rPr lang="en-US" sz="3600" dirty="0" smtClean="0"/>
+              <a:t>, </a:t>
+            </a:r>
+            <a:r>
+              <a:rPr lang="en-US" sz="3600" dirty="0" err="1" smtClean="0"/>
+              <a:t>relu</a:t>
+            </a:r>
+            <a:r>
+              <a:rPr lang="en-US" sz="3600" dirty="0" smtClean="0"/>
+              <a:t>, activation, linear etc.)</a:t>
+            </a:r>
+            <a:endParaRPr lang="en-US" sz="3600" dirty="0"/>
+          </a:p>
+        </p:txBody>
+      </p:sp>
+    </p:spTree>
+    <p:extLst>
+      <p:ext uri="{BB962C8B-B14F-4D97-AF65-F5344CB8AC3E}">
+        <p14:creationId xmlns:p14="http://schemas.microsoft.com/office/powerpoint/2010/main" val="243913501"/>
+      </p:ext>
+    </p:extLst>
+  </p:cSld>
+  <p:clrMapOvr>
+    <a:masterClrMapping/>
+  </p:clrMapOvr>
+</p:sld>
+</file>
+
+<file path=ppt/slides/slide16.xml><?xml version="1.0" encoding="utf-8"?>
+<p:sld xmlns:a="http://schemas.openxmlformats.org/drawingml/2006/main" xmlns:r="http://schemas.openxmlformats.org/officeDocument/2006/relationships" xmlns:p="http://schemas.openxmlformats.org/presentationml/2006/main">
+  <p:cSld>
+    <p:spTree>
+      <p:nvGrpSpPr>
+        <p:cNvPr id="1" name=""/>
+        <p:cNvGrpSpPr/>
+        <p:nvPr/>
+      </p:nvGrpSpPr>
+      <p:grpSpPr>
+        <a:xfrm>
+          <a:off x="0" y="0"/>
+          <a:ext cx="0" cy="0"/>
+          <a:chOff x="0" y="0"/>
+          <a:chExt cx="0" cy="0"/>
+        </a:xfrm>
+      </p:grpSpPr>
+      <p:sp>
+        <p:nvSpPr>
+          <p:cNvPr id="2" name="Title 1"/>
+          <p:cNvSpPr>
+            <a:spLocks noGrp="1"/>
+          </p:cNvSpPr>
+          <p:nvPr>
+            <p:ph type="title"/>
+          </p:nvPr>
+        </p:nvSpPr>
+        <p:spPr/>
+        <p:txBody>
+          <a:bodyPr/>
+          <a:lstStyle/>
+          <a:p>
+            <a:r>
+              <a:rPr lang="en-US" dirty="0" smtClean="0"/>
+              <a:t>Input and outputs</a:t>
+            </a:r>
+            <a:endParaRPr lang="en-US" dirty="0"/>
+          </a:p>
+        </p:txBody>
+      </p:sp>
+      <p:sp>
+        <p:nvSpPr>
+          <p:cNvPr id="3" name="Content Placeholder 2"/>
+          <p:cNvSpPr>
+            <a:spLocks noGrp="1"/>
+          </p:cNvSpPr>
+          <p:nvPr>
+            <p:ph idx="1"/>
+          </p:nvPr>
+        </p:nvSpPr>
+        <p:spPr/>
+        <p:txBody>
+          <a:bodyPr>
+            <a:normAutofit/>
+          </a:bodyPr>
+          <a:lstStyle/>
+          <a:p>
+            <a:r>
+              <a:rPr lang="en-US" sz="4000" dirty="0" smtClean="0"/>
+              <a:t>model </a:t>
+            </a:r>
+            <a:r>
+              <a:rPr lang="en-US" sz="4000" dirty="0"/>
+              <a:t>= Model(inputs</a:t>
+            </a:r>
+            <a:r>
+              <a:rPr lang="en-US" sz="4000" dirty="0" smtClean="0"/>
+              <a:t>=[input1,input2… </a:t>
+            </a:r>
+            <a:r>
+              <a:rPr lang="en-US" sz="4000" dirty="0" err="1" smtClean="0"/>
+              <a:t>inputN</a:t>
+            </a:r>
+            <a:r>
+              <a:rPr lang="en-US" sz="4000" dirty="0" smtClean="0"/>
+              <a:t>], </a:t>
+            </a:r>
+            <a:r>
+              <a:rPr lang="en-US" sz="4000" dirty="0"/>
+              <a:t>outputs</a:t>
+            </a:r>
+            <a:r>
+              <a:rPr lang="en-US" sz="4000" dirty="0" smtClean="0"/>
+              <a:t>=[output1, output2… </a:t>
+            </a:r>
+            <a:r>
+              <a:rPr lang="en-US" sz="4000" dirty="0" err="1" smtClean="0"/>
+              <a:t>outputN</a:t>
+            </a:r>
+            <a:r>
+              <a:rPr lang="en-US" sz="4000" dirty="0" smtClean="0"/>
+              <a:t>])</a:t>
+            </a:r>
+            <a:endParaRPr lang="en-US" sz="4000" dirty="0"/>
+          </a:p>
+        </p:txBody>
+      </p:sp>
+    </p:spTree>
+    <p:extLst>
+      <p:ext uri="{BB962C8B-B14F-4D97-AF65-F5344CB8AC3E}">
+        <p14:creationId xmlns:p14="http://schemas.microsoft.com/office/powerpoint/2010/main" val="175955231"/>
+      </p:ext>
+    </p:extLst>
+  </p:cSld>
+  <p:clrMapOvr>
+    <a:masterClrMapping/>
+  </p:clrMapOvr>
+</p:sld>
+</file>
+
+<file path=ppt/slides/slide17.xml><?xml version="1.0" encoding="utf-8"?>
+<p:sld xmlns:a="http://schemas.openxmlformats.org/drawingml/2006/main" xmlns:r="http://schemas.openxmlformats.org/officeDocument/2006/relationships" xmlns:p="http://schemas.openxmlformats.org/presentationml/2006/main">
+  <p:cSld>
+    <p:spTree>
+      <p:nvGrpSpPr>
+        <p:cNvPr id="1" name=""/>
+        <p:cNvGrpSpPr/>
+        <p:nvPr/>
+      </p:nvGrpSpPr>
+      <p:grpSpPr>
+        <a:xfrm>
+          <a:off x="0" y="0"/>
+          <a:ext cx="0" cy="0"/>
+          <a:chOff x="0" y="0"/>
+          <a:chExt cx="0" cy="0"/>
+        </a:xfrm>
+      </p:grpSpPr>
+      <p:sp>
+        <p:nvSpPr>
+          <p:cNvPr id="2" name="Title 1"/>
+          <p:cNvSpPr>
+            <a:spLocks noGrp="1"/>
+          </p:cNvSpPr>
+          <p:nvPr>
+            <p:ph type="title"/>
+          </p:nvPr>
+        </p:nvSpPr>
+        <p:spPr/>
+        <p:txBody>
+          <a:bodyPr/>
+          <a:lstStyle/>
+          <a:p>
+            <a:r>
+              <a:rPr lang="en-US" dirty="0" err="1" smtClean="0"/>
+              <a:t>Concat</a:t>
+            </a:r>
+            <a:endParaRPr lang="en-US" dirty="0"/>
+          </a:p>
+        </p:txBody>
+      </p:sp>
+      <p:sp>
+        <p:nvSpPr>
+          <p:cNvPr id="3" name="Content Placeholder 2"/>
+          <p:cNvSpPr>
+            <a:spLocks noGrp="1"/>
+          </p:cNvSpPr>
+          <p:nvPr>
+            <p:ph idx="1"/>
+          </p:nvPr>
+        </p:nvSpPr>
+        <p:spPr/>
+        <p:txBody>
+          <a:bodyPr>
+            <a:normAutofit/>
+          </a:bodyPr>
+          <a:lstStyle/>
+          <a:p>
+            <a:r>
+              <a:rPr lang="en-US" sz="4000" dirty="0" err="1"/>
+              <a:t>keras.layers.Concatenate</a:t>
+            </a:r>
+            <a:r>
+              <a:rPr lang="en-US" sz="4000" dirty="0"/>
+              <a:t>(axis=-1</a:t>
+            </a:r>
+            <a:r>
+              <a:rPr lang="en-US" sz="4000" dirty="0" smtClean="0"/>
+              <a:t>)</a:t>
+            </a:r>
+          </a:p>
+          <a:p>
+            <a:endParaRPr lang="en-US" sz="4000" dirty="0"/>
+          </a:p>
+          <a:p>
+            <a:r>
+              <a:rPr lang="en-US" sz="4000" i="1" dirty="0" smtClean="0"/>
+              <a:t>[1,2,3]</a:t>
+            </a:r>
+            <a:r>
+              <a:rPr lang="en-US" sz="4000" dirty="0" smtClean="0"/>
+              <a:t> concatenated with </a:t>
+            </a:r>
+            <a:r>
+              <a:rPr lang="en-US" sz="4000" i="1" dirty="0" smtClean="0"/>
+              <a:t>[4,5,6]</a:t>
+            </a:r>
+            <a:r>
+              <a:rPr lang="en-US" sz="4000" dirty="0" smtClean="0"/>
+              <a:t> = </a:t>
+            </a:r>
+            <a:r>
+              <a:rPr lang="en-US" sz="4000" i="1" dirty="0" smtClean="0"/>
+              <a:t>[1,2,3,4,5,6]</a:t>
+            </a:r>
+            <a:endParaRPr lang="en-US" sz="4000" i="1" dirty="0"/>
+          </a:p>
+          <a:p>
+            <a:endParaRPr lang="en-US" sz="4000" dirty="0"/>
+          </a:p>
+        </p:txBody>
+      </p:sp>
+    </p:spTree>
+    <p:extLst>
+      <p:ext uri="{BB962C8B-B14F-4D97-AF65-F5344CB8AC3E}">
+        <p14:creationId xmlns:p14="http://schemas.microsoft.com/office/powerpoint/2010/main" val="4023721921"/>
+      </p:ext>
+    </p:extLst>
+  </p:cSld>
+  <p:clrMapOvr>
+    <a:masterClrMapping/>
+  </p:clrMapOvr>
+</p:sld>
+</file>
+
 <file path=ppt/slides/slide2.xml><?xml version="1.0" encoding="utf-8"?>
 <p:sld xmlns:a="http://schemas.openxmlformats.org/drawingml/2006/main" xmlns:r="http://schemas.openxmlformats.org/officeDocument/2006/relationships" xmlns:p="http://schemas.openxmlformats.org/presentationml/2006/main">
   <p:cSld>
@@ -4570,6 +5516,77 @@
           </a:p>
         </p:txBody>
       </p:sp>
+      <p:pic>
+        <p:nvPicPr>
+          <p:cNvPr id="3074" name="Picture 2" descr="Image result for stochastic gradient descent"/>
+          <p:cNvPicPr>
+            <a:picLocks noChangeAspect="1" noChangeArrowheads="1"/>
+          </p:cNvPicPr>
+          <p:nvPr/>
+        </p:nvPicPr>
+        <p:blipFill>
+          <a:blip r:embed="rId3">
+            <a:extLst>
+              <a:ext uri="{28A0092B-C50C-407E-A947-70E740481C1C}">
+                <a14:useLocalDpi xmlns:a14="http://schemas.microsoft.com/office/drawing/2010/main" val="0"/>
+              </a:ext>
+            </a:extLst>
+          </a:blip>
+          <a:srcRect/>
+          <a:stretch>
+            <a:fillRect/>
+          </a:stretch>
+        </p:blipFill>
+        <p:spPr bwMode="auto">
+          <a:xfrm>
+            <a:off x="223058" y="1946925"/>
+            <a:ext cx="3130110" cy="1695043"/>
+          </a:xfrm>
+          <a:prstGeom prst="rect">
+            <a:avLst/>
+          </a:prstGeom>
+          <a:noFill/>
+          <a:extLst>
+            <a:ext uri="{909E8E84-426E-40DD-AFC4-6F175D3DCCD1}">
+              <a14:hiddenFill xmlns:a14="http://schemas.microsoft.com/office/drawing/2010/main">
+                <a:solidFill>
+                  <a:srgbClr val="FFFFFF"/>
+                </a:solidFill>
+              </a14:hiddenFill>
+            </a:ext>
+          </a:extLst>
+        </p:spPr>
+      </p:pic>
+      <p:sp>
+        <p:nvSpPr>
+          <p:cNvPr id="3" name="TextBox 2"/>
+          <p:cNvSpPr txBox="1"/>
+          <p:nvPr/>
+        </p:nvSpPr>
+        <p:spPr>
+          <a:xfrm>
+            <a:off x="836246" y="3701108"/>
+            <a:ext cx="1199944" cy="369332"/>
+          </a:xfrm>
+          <a:prstGeom prst="rect">
+            <a:avLst/>
+          </a:prstGeom>
+          <a:noFill/>
+        </p:spPr>
+        <p:txBody>
+          <a:bodyPr wrap="none" rtlCol="0">
+            <a:spAutoFit/>
+          </a:bodyPr>
+          <a:lstStyle/>
+          <a:p>
+            <a:r>
+              <a:rPr lang="en-US" dirty="0" smtClean="0"/>
+              <a:t>Optimizing</a:t>
+            </a:r>
+            <a:endParaRPr lang="en-US" dirty="0"/>
+          </a:p>
+        </p:txBody>
+      </p:sp>
     </p:spTree>
     <p:extLst>
       <p:ext uri="{BB962C8B-B14F-4D97-AF65-F5344CB8AC3E}">
@@ -5349,11 +6366,7 @@
           <a:p>
             <a:r>
               <a:rPr lang="en-US" dirty="0" smtClean="0"/>
-              <a:t>Other concerns </a:t>
-            </a:r>
-            <a:r>
-              <a:rPr lang="en-US" dirty="0" smtClean="0"/>
-              <a:t>(or </a:t>
+              <a:t>Other concerns (or </a:t>
             </a:r>
             <a:r>
               <a:rPr lang="en-US" dirty="0" err="1" smtClean="0"/>
@@ -5435,11 +6448,7 @@
           <a:p>
             <a:r>
               <a:rPr lang="en-US" sz="2400" dirty="0" smtClean="0"/>
-              <a:t>Initializers, </a:t>
-            </a:r>
-            <a:r>
-              <a:rPr lang="en-US" sz="2400" dirty="0" smtClean="0"/>
-              <a:t>activations</a:t>
+              <a:t>Initializers, activations</a:t>
             </a:r>
           </a:p>
           <a:p>
@@ -5447,7 +6456,6 @@
               <a:rPr lang="en-US" sz="2400" dirty="0" smtClean="0"/>
               <a:t>“Pre training”</a:t>
             </a:r>
-            <a:endParaRPr lang="en-US" sz="2400" dirty="0" smtClean="0"/>
           </a:p>
           <a:p>
             <a:endParaRPr lang="en-US" sz="2400" dirty="0"/>
@@ -5509,7 +6517,7 @@
 </file>
 
 <file path=ppt/slides/slide9.xml><?xml version="1.0" encoding="utf-8"?>
-<p:sld xmlns:a="http://schemas.openxmlformats.org/drawingml/2006/main" xmlns:r="http://schemas.openxmlformats.org/officeDocument/2006/relationships" xmlns:p="http://schemas.openxmlformats.org/presentationml/2006/main">
+<p:sld xmlns:a="http://schemas.openxmlformats.org/drawingml/2006/main" xmlns:r="http://schemas.openxmlformats.org/officeDocument/2006/relationships" xmlns:p="http://schemas.openxmlformats.org/presentationml/2006/main" show="0">
   <p:cSld>
     <p:spTree>
       <p:nvGrpSpPr>
@@ -5541,8 +6549,16 @@
           <a:lstStyle/>
           <a:p>
             <a:r>
+              <a:rPr lang="en-US" dirty="0" err="1" smtClean="0"/>
+              <a:t>ReLU</a:t>
+            </a:r>
+            <a:r>
               <a:rPr lang="en-US" dirty="0" smtClean="0"/>
-              <a:t>Hands on time</a:t>
+              <a:t> vs Sigmoid vs </a:t>
+            </a:r>
+            <a:r>
+              <a:rPr lang="en-US" dirty="0" err="1" smtClean="0"/>
+              <a:t>TanH</a:t>
             </a:r>
             <a:endParaRPr lang="en-US" dirty="0"/>
           </a:p>
@@ -5563,13 +6579,13 @@
           <a:bodyPr/>
           <a:lstStyle/>
           <a:p>
-            <a:endParaRPr lang="en-US"/>
+            <a:endParaRPr lang="en-US" dirty="0"/>
           </a:p>
         </p:txBody>
       </p:sp>
       <p:pic>
         <p:nvPicPr>
-          <p:cNvPr id="1026" name="Picture 2" descr="JAZZ HANDS Cat cat small to medium sized cats cat like mammal whiskers"/>
+          <p:cNvPr id="6146" name="Picture 2" descr="Image result for relu vs tanh vs sigmoid"/>
           <p:cNvPicPr>
             <a:picLocks noChangeAspect="1" noChangeArrowheads="1"/>
           </p:cNvPicPr>
@@ -5590,8 +6606,8 @@
         </p:blipFill>
         <p:spPr bwMode="auto">
           <a:xfrm>
-            <a:off x="4643717" y="1737360"/>
-            <a:ext cx="3409763" cy="4439796"/>
+            <a:off x="158390" y="1893860"/>
+            <a:ext cx="11937357" cy="3491470"/>
           </a:xfrm>
           <a:prstGeom prst="rect">
             <a:avLst/>
@@ -5611,13 +6627,21 @@
     </p:spTree>
     <p:extLst>
       <p:ext uri="{BB962C8B-B14F-4D97-AF65-F5344CB8AC3E}">
-        <p14:creationId xmlns:p14="http://schemas.microsoft.com/office/powerpoint/2010/main" val="2642274662"/>
+        <p14:creationId xmlns:p14="http://schemas.microsoft.com/office/powerpoint/2010/main" val="1809559016"/>
       </p:ext>
     </p:extLst>
   </p:cSld>
   <p:clrMapOvr>
     <a:masterClrMapping/>
   </p:clrMapOvr>
+  <mc:AlternateContent xmlns:mc="http://schemas.openxmlformats.org/markup-compatibility/2006">
+    <mc:Choice xmlns:p14="http://schemas.microsoft.com/office/powerpoint/2010/main" Requires="p14">
+      <p:transition spd="slow" p14:dur="2000"/>
+    </mc:Choice>
+    <mc:Fallback>
+      <p:transition spd="slow"/>
+    </mc:Fallback>
+  </mc:AlternateContent>
 </p:sld>
 </file>
 

</xml_diff>